<commit_message>
Add reading notes for chapter 2
</commit_message>
<xml_diff>
--- a/docs/kafka/Kafka_The_Definitive_Guide/Chapter_2_Installing_Kafka.pptx
+++ b/docs/kafka/Kafka_The_Definitive_Guide/Chapter_2_Installing_Kafka.pptx
@@ -5,7 +5,7 @@
     <p:sldMasterId id="2147483648" r:id="rId1"/>
   </p:sldMasterIdLst>
   <p:notesMasterIdLst>
-    <p:notesMasterId r:id="rId13"/>
+    <p:notesMasterId r:id="rId16"/>
   </p:notesMasterIdLst>
   <p:sldIdLst>
     <p:sldId id="256" r:id="rId2"/>
@@ -16,9 +16,12 @@
     <p:sldId id="279" r:id="rId7"/>
     <p:sldId id="280" r:id="rId8"/>
     <p:sldId id="281" r:id="rId9"/>
-    <p:sldId id="282" r:id="rId10"/>
-    <p:sldId id="283" r:id="rId11"/>
-    <p:sldId id="276" r:id="rId12"/>
+    <p:sldId id="284" r:id="rId10"/>
+    <p:sldId id="285" r:id="rId11"/>
+    <p:sldId id="287" r:id="rId12"/>
+    <p:sldId id="286" r:id="rId13"/>
+    <p:sldId id="288" r:id="rId14"/>
+    <p:sldId id="276" r:id="rId15"/>
   </p:sldIdLst>
   <p:sldSz cx="12192000" cy="6858000"/>
   <p:notesSz cx="6858000" cy="9144000"/>
@@ -218,7 +221,7 @@
           <a:p>
             <a:fld id="{90F9DEB8-8AD6-7448-9DFB-429E55152BD8}" type="datetimeFigureOut">
               <a:rPr lang="en-US" smtClean="0"/>
-              <a:t>2/25/18</a:t>
+              <a:t>3/4/18</a:t>
             </a:fld>
             <a:endParaRPr lang="en-US"/>
           </a:p>
@@ -617,7 +620,7 @@
           <a:p>
             <a:fld id="{05DC482E-3DE2-2342-B782-359AF6345E48}" type="datetimeFigureOut">
               <a:rPr lang="en-US" smtClean="0"/>
-              <a:t>2/25/18</a:t>
+              <a:t>3/4/18</a:t>
             </a:fld>
             <a:endParaRPr lang="en-US"/>
           </a:p>
@@ -787,7 +790,7 @@
           <a:p>
             <a:fld id="{05DC482E-3DE2-2342-B782-359AF6345E48}" type="datetimeFigureOut">
               <a:rPr lang="en-US" smtClean="0"/>
-              <a:t>2/25/18</a:t>
+              <a:t>3/4/18</a:t>
             </a:fld>
             <a:endParaRPr lang="en-US"/>
           </a:p>
@@ -967,7 +970,7 @@
           <a:p>
             <a:fld id="{05DC482E-3DE2-2342-B782-359AF6345E48}" type="datetimeFigureOut">
               <a:rPr lang="en-US" smtClean="0"/>
-              <a:t>2/25/18</a:t>
+              <a:t>3/4/18</a:t>
             </a:fld>
             <a:endParaRPr lang="en-US"/>
           </a:p>
@@ -1137,7 +1140,7 @@
           <a:p>
             <a:fld id="{05DC482E-3DE2-2342-B782-359AF6345E48}" type="datetimeFigureOut">
               <a:rPr lang="en-US" smtClean="0"/>
-              <a:t>2/25/18</a:t>
+              <a:t>3/4/18</a:t>
             </a:fld>
             <a:endParaRPr lang="en-US"/>
           </a:p>
@@ -1383,7 +1386,7 @@
           <a:p>
             <a:fld id="{05DC482E-3DE2-2342-B782-359AF6345E48}" type="datetimeFigureOut">
               <a:rPr lang="en-US" smtClean="0"/>
-              <a:t>2/25/18</a:t>
+              <a:t>3/4/18</a:t>
             </a:fld>
             <a:endParaRPr lang="en-US"/>
           </a:p>
@@ -1615,7 +1618,7 @@
           <a:p>
             <a:fld id="{05DC482E-3DE2-2342-B782-359AF6345E48}" type="datetimeFigureOut">
               <a:rPr lang="en-US" smtClean="0"/>
-              <a:t>2/25/18</a:t>
+              <a:t>3/4/18</a:t>
             </a:fld>
             <a:endParaRPr lang="en-US"/>
           </a:p>
@@ -1982,7 +1985,7 @@
           <a:p>
             <a:fld id="{05DC482E-3DE2-2342-B782-359AF6345E48}" type="datetimeFigureOut">
               <a:rPr lang="en-US" smtClean="0"/>
-              <a:t>2/25/18</a:t>
+              <a:t>3/4/18</a:t>
             </a:fld>
             <a:endParaRPr lang="en-US"/>
           </a:p>
@@ -2100,7 +2103,7 @@
           <a:p>
             <a:fld id="{05DC482E-3DE2-2342-B782-359AF6345E48}" type="datetimeFigureOut">
               <a:rPr lang="en-US" smtClean="0"/>
-              <a:t>2/25/18</a:t>
+              <a:t>3/4/18</a:t>
             </a:fld>
             <a:endParaRPr lang="en-US"/>
           </a:p>
@@ -2195,7 +2198,7 @@
           <a:p>
             <a:fld id="{05DC482E-3DE2-2342-B782-359AF6345E48}" type="datetimeFigureOut">
               <a:rPr lang="en-US" smtClean="0"/>
-              <a:t>2/25/18</a:t>
+              <a:t>3/4/18</a:t>
             </a:fld>
             <a:endParaRPr lang="en-US"/>
           </a:p>
@@ -2472,7 +2475,7 @@
           <a:p>
             <a:fld id="{05DC482E-3DE2-2342-B782-359AF6345E48}" type="datetimeFigureOut">
               <a:rPr lang="en-US" smtClean="0"/>
-              <a:t>2/25/18</a:t>
+              <a:t>3/4/18</a:t>
             </a:fld>
             <a:endParaRPr lang="en-US"/>
           </a:p>
@@ -2725,7 +2728,7 @@
           <a:p>
             <a:fld id="{05DC482E-3DE2-2342-B782-359AF6345E48}" type="datetimeFigureOut">
               <a:rPr lang="en-US" smtClean="0"/>
-              <a:t>2/25/18</a:t>
+              <a:t>3/4/18</a:t>
             </a:fld>
             <a:endParaRPr lang="en-US"/>
           </a:p>
@@ -2938,7 +2941,7 @@
           <a:p>
             <a:fld id="{05DC482E-3DE2-2342-B782-359AF6345E48}" type="datetimeFigureOut">
               <a:rPr lang="en-US" smtClean="0"/>
-              <a:t>2/25/18</a:t>
+              <a:t>3/4/18</a:t>
             </a:fld>
             <a:endParaRPr lang="en-US"/>
           </a:p>
@@ -3442,7 +3445,19 @@
           <a:p>
             <a:r>
               <a:rPr lang="en-US" dirty="0" smtClean="0"/>
-              <a:t>Production Concerns</a:t>
+              <a:t>Hardware </a:t>
+            </a:r>
+            <a:r>
+              <a:rPr lang="en-US" dirty="0" smtClean="0"/>
+              <a:t>Selection </a:t>
+            </a:r>
+            <a:r>
+              <a:rPr lang="mr-IN" dirty="0" smtClean="0"/>
+              <a:t>–</a:t>
+            </a:r>
+            <a:r>
+              <a:rPr lang="en-US" dirty="0" smtClean="0"/>
+              <a:t> Disk Capacity</a:t>
             </a:r>
             <a:endParaRPr lang="en-US" dirty="0"/>
           </a:p>
@@ -3463,14 +3478,67 @@
           <a:bodyPr/>
           <a:lstStyle/>
           <a:p>
-            <a:endParaRPr lang="en-US" dirty="0"/>
+            <a:pPr lvl="1"/>
+            <a:r>
+              <a:rPr lang="en-US" dirty="0" smtClean="0"/>
+              <a:t>The </a:t>
+            </a:r>
+            <a:r>
+              <a:rPr lang="en-US" b="1" u="sng" dirty="0" smtClean="0"/>
+              <a:t>number of messages that need to be retained</a:t>
+            </a:r>
+            <a:r>
+              <a:rPr lang="en-US" dirty="0" smtClean="0"/>
+              <a:t> at any time is determined by the amount of disk capacity.</a:t>
+            </a:r>
+          </a:p>
+          <a:p>
+            <a:pPr lvl="1"/>
+            <a:r>
+              <a:rPr lang="en-US" b="1" dirty="0" smtClean="0"/>
+              <a:t>Reason</a:t>
+            </a:r>
+            <a:r>
+              <a:rPr lang="en-US" dirty="0" smtClean="0"/>
+              <a:t>: Kafka partitions are stored as files on the disk. The total amount of data on disk is equal to or even larger than the </a:t>
+            </a:r>
+            <a:r>
+              <a:rPr lang="en-US" i="1" u="sng" dirty="0" smtClean="0"/>
+              <a:t>daily traffic * retention periods(days) + buffer.</a:t>
+            </a:r>
+            <a:endParaRPr lang="en-US" b="1" i="1" u="sng" dirty="0" smtClean="0"/>
+          </a:p>
+          <a:p>
+            <a:pPr lvl="1"/>
+            <a:r>
+              <a:rPr lang="en-US" b="1" dirty="0" smtClean="0"/>
+              <a:t>Improve</a:t>
+            </a:r>
+            <a:r>
+              <a:rPr lang="en-US" dirty="0" smtClean="0"/>
+              <a:t>: </a:t>
+            </a:r>
+          </a:p>
+          <a:p>
+            <a:pPr lvl="2"/>
+            <a:r>
+              <a:rPr lang="en-US" dirty="0" smtClean="0"/>
+              <a:t>Add more storage to broker</a:t>
+            </a:r>
+          </a:p>
+          <a:p>
+            <a:pPr lvl="2"/>
+            <a:r>
+              <a:rPr lang="en-US" dirty="0" smtClean="0"/>
+              <a:t>Add more broker to cluster</a:t>
+            </a:r>
           </a:p>
         </p:txBody>
       </p:sp>
     </p:spTree>
     <p:extLst>
       <p:ext uri="{BB962C8B-B14F-4D97-AF65-F5344CB8AC3E}">
-        <p14:creationId xmlns:p14="http://schemas.microsoft.com/office/powerpoint/2010/main" val="1490566012"/>
+        <p14:creationId xmlns:p14="http://schemas.microsoft.com/office/powerpoint/2010/main" val="1793816407"/>
       </p:ext>
     </p:extLst>
   </p:cSld>
@@ -3481,6 +3549,400 @@
 </file>
 
 <file path=ppt/slides/slide11.xml><?xml version="1.0" encoding="utf-8"?>
+<p:sld xmlns:a="http://schemas.openxmlformats.org/drawingml/2006/main" xmlns:r="http://schemas.openxmlformats.org/officeDocument/2006/relationships" xmlns:p="http://schemas.openxmlformats.org/presentationml/2006/main">
+  <p:cSld>
+    <p:spTree>
+      <p:nvGrpSpPr>
+        <p:cNvPr id="1" name=""/>
+        <p:cNvGrpSpPr/>
+        <p:nvPr/>
+      </p:nvGrpSpPr>
+      <p:grpSpPr>
+        <a:xfrm>
+          <a:off x="0" y="0"/>
+          <a:ext cx="0" cy="0"/>
+          <a:chOff x="0" y="0"/>
+          <a:chExt cx="0" cy="0"/>
+        </a:xfrm>
+      </p:grpSpPr>
+      <p:sp>
+        <p:nvSpPr>
+          <p:cNvPr id="2" name="Title 1"/>
+          <p:cNvSpPr>
+            <a:spLocks noGrp="1"/>
+          </p:cNvSpPr>
+          <p:nvPr>
+            <p:ph type="title"/>
+          </p:nvPr>
+        </p:nvSpPr>
+        <p:spPr/>
+        <p:txBody>
+          <a:bodyPr/>
+          <a:lstStyle/>
+          <a:p>
+            <a:r>
+              <a:rPr lang="en-US" dirty="0" smtClean="0"/>
+              <a:t>Hardware </a:t>
+            </a:r>
+            <a:r>
+              <a:rPr lang="en-US" dirty="0" smtClean="0"/>
+              <a:t>Selection </a:t>
+            </a:r>
+            <a:r>
+              <a:rPr lang="mr-IN" dirty="0" smtClean="0"/>
+              <a:t>–</a:t>
+            </a:r>
+            <a:r>
+              <a:rPr lang="en-US" dirty="0" smtClean="0"/>
+              <a:t> Memory</a:t>
+            </a:r>
+            <a:endParaRPr lang="en-US" dirty="0"/>
+          </a:p>
+        </p:txBody>
+      </p:sp>
+      <p:sp>
+        <p:nvSpPr>
+          <p:cNvPr id="3" name="Content Placeholder 2"/>
+          <p:cNvSpPr>
+            <a:spLocks noGrp="1"/>
+          </p:cNvSpPr>
+          <p:nvPr>
+            <p:ph idx="1"/>
+          </p:nvPr>
+        </p:nvSpPr>
+        <p:spPr/>
+        <p:txBody>
+          <a:bodyPr/>
+          <a:lstStyle/>
+          <a:p>
+            <a:pPr lvl="1"/>
+            <a:r>
+              <a:rPr lang="en-US" dirty="0" smtClean="0"/>
+              <a:t>Having more memory available to the system for page cache will improve the </a:t>
+            </a:r>
+            <a:r>
+              <a:rPr lang="en-US" b="1" u="sng" dirty="0" smtClean="0"/>
+              <a:t>performance of consumer clients</a:t>
+            </a:r>
+            <a:r>
+              <a:rPr lang="en-US" dirty="0" smtClean="0"/>
+              <a:t>.</a:t>
+            </a:r>
+          </a:p>
+          <a:p>
+            <a:pPr lvl="1"/>
+            <a:r>
+              <a:rPr lang="en-US" b="1" dirty="0" smtClean="0"/>
+              <a:t>Reason</a:t>
+            </a:r>
+            <a:r>
+              <a:rPr lang="en-US" dirty="0" smtClean="0"/>
+              <a:t>: the messages the consumer is reading are optionally stored in the system’s page cache, which is used by Kafka to cache log </a:t>
+            </a:r>
+            <a:r>
+              <a:rPr lang="en-US" dirty="0" err="1" smtClean="0"/>
+              <a:t>sgments</a:t>
+            </a:r>
+            <a:r>
+              <a:rPr lang="en-US" dirty="0" smtClean="0"/>
+              <a:t>, in situation where the consumer is caught up and lagging behind the producers very little.</a:t>
+            </a:r>
+            <a:endParaRPr lang="en-US" b="1" dirty="0" smtClean="0"/>
+          </a:p>
+          <a:p>
+            <a:pPr lvl="1"/>
+            <a:r>
+              <a:rPr lang="en-US" b="1" dirty="0" smtClean="0"/>
+              <a:t>Improve</a:t>
+            </a:r>
+            <a:r>
+              <a:rPr lang="en-US" dirty="0" smtClean="0"/>
+              <a:t>: </a:t>
+            </a:r>
+          </a:p>
+          <a:p>
+            <a:pPr lvl="2"/>
+            <a:r>
+              <a:rPr lang="en-US" dirty="0" smtClean="0"/>
+              <a:t>Add more memory</a:t>
+            </a:r>
+          </a:p>
+        </p:txBody>
+      </p:sp>
+    </p:spTree>
+    <p:extLst>
+      <p:ext uri="{BB962C8B-B14F-4D97-AF65-F5344CB8AC3E}">
+        <p14:creationId xmlns:p14="http://schemas.microsoft.com/office/powerpoint/2010/main" val="582807695"/>
+      </p:ext>
+    </p:extLst>
+  </p:cSld>
+  <p:clrMapOvr>
+    <a:masterClrMapping/>
+  </p:clrMapOvr>
+</p:sld>
+</file>
+
+<file path=ppt/slides/slide12.xml><?xml version="1.0" encoding="utf-8"?>
+<p:sld xmlns:a="http://schemas.openxmlformats.org/drawingml/2006/main" xmlns:r="http://schemas.openxmlformats.org/officeDocument/2006/relationships" xmlns:p="http://schemas.openxmlformats.org/presentationml/2006/main">
+  <p:cSld>
+    <p:spTree>
+      <p:nvGrpSpPr>
+        <p:cNvPr id="1" name=""/>
+        <p:cNvGrpSpPr/>
+        <p:nvPr/>
+      </p:nvGrpSpPr>
+      <p:grpSpPr>
+        <a:xfrm>
+          <a:off x="0" y="0"/>
+          <a:ext cx="0" cy="0"/>
+          <a:chOff x="0" y="0"/>
+          <a:chExt cx="0" cy="0"/>
+        </a:xfrm>
+      </p:grpSpPr>
+      <p:sp>
+        <p:nvSpPr>
+          <p:cNvPr id="2" name="Title 1"/>
+          <p:cNvSpPr>
+            <a:spLocks noGrp="1"/>
+          </p:cNvSpPr>
+          <p:nvPr>
+            <p:ph type="title"/>
+          </p:nvPr>
+        </p:nvSpPr>
+        <p:spPr/>
+        <p:txBody>
+          <a:bodyPr/>
+          <a:lstStyle/>
+          <a:p>
+            <a:r>
+              <a:rPr lang="en-US" dirty="0" smtClean="0"/>
+              <a:t>Hardware </a:t>
+            </a:r>
+            <a:r>
+              <a:rPr lang="en-US" dirty="0" smtClean="0"/>
+              <a:t>Selection </a:t>
+            </a:r>
+            <a:r>
+              <a:rPr lang="mr-IN" dirty="0" smtClean="0"/>
+              <a:t>–</a:t>
+            </a:r>
+            <a:r>
+              <a:rPr lang="en-US" dirty="0" smtClean="0"/>
+              <a:t> Networking</a:t>
+            </a:r>
+            <a:endParaRPr lang="en-US" dirty="0"/>
+          </a:p>
+        </p:txBody>
+      </p:sp>
+      <p:sp>
+        <p:nvSpPr>
+          <p:cNvPr id="3" name="Content Placeholder 2"/>
+          <p:cNvSpPr>
+            <a:spLocks noGrp="1"/>
+          </p:cNvSpPr>
+          <p:nvPr>
+            <p:ph idx="1"/>
+          </p:nvPr>
+        </p:nvSpPr>
+        <p:spPr/>
+        <p:txBody>
+          <a:bodyPr/>
+          <a:lstStyle/>
+          <a:p>
+            <a:pPr lvl="1"/>
+            <a:r>
+              <a:rPr lang="en-US" dirty="0" smtClean="0"/>
+              <a:t>The available network throughput will specify the maximum amount of traffic that Kafka can handle. The governing factor, combined with disk storage, for </a:t>
+            </a:r>
+            <a:r>
+              <a:rPr lang="en-US" b="1" u="sng" dirty="0" smtClean="0"/>
+              <a:t>cluster sizing</a:t>
+            </a:r>
+            <a:r>
+              <a:rPr lang="en-US" dirty="0" smtClean="0"/>
+              <a:t>.</a:t>
+            </a:r>
+          </a:p>
+          <a:p>
+            <a:pPr lvl="1"/>
+            <a:r>
+              <a:rPr lang="en-US" b="1" dirty="0" smtClean="0"/>
+              <a:t>Reason</a:t>
+            </a:r>
+            <a:r>
+              <a:rPr lang="en-US" dirty="0" smtClean="0"/>
+              <a:t>: producer, consumer, along with cluster replication and mirroring, all increase requirements.</a:t>
+            </a:r>
+            <a:endParaRPr lang="en-US" b="1" dirty="0" smtClean="0"/>
+          </a:p>
+          <a:p>
+            <a:pPr lvl="1"/>
+            <a:r>
+              <a:rPr lang="en-US" b="1" dirty="0" smtClean="0"/>
+              <a:t>Improve</a:t>
+            </a:r>
+            <a:r>
+              <a:rPr lang="en-US" dirty="0" smtClean="0"/>
+              <a:t>: </a:t>
+            </a:r>
+          </a:p>
+          <a:p>
+            <a:pPr lvl="2"/>
+            <a:r>
+              <a:rPr lang="en-US" dirty="0" smtClean="0"/>
+              <a:t>Increase the network inbound/outbound throughput</a:t>
+            </a:r>
+          </a:p>
+        </p:txBody>
+      </p:sp>
+    </p:spTree>
+    <p:extLst>
+      <p:ext uri="{BB962C8B-B14F-4D97-AF65-F5344CB8AC3E}">
+        <p14:creationId xmlns:p14="http://schemas.microsoft.com/office/powerpoint/2010/main" val="65788011"/>
+      </p:ext>
+    </p:extLst>
+  </p:cSld>
+  <p:clrMapOvr>
+    <a:masterClrMapping/>
+  </p:clrMapOvr>
+</p:sld>
+</file>
+
+<file path=ppt/slides/slide13.xml><?xml version="1.0" encoding="utf-8"?>
+<p:sld xmlns:a="http://schemas.openxmlformats.org/drawingml/2006/main" xmlns:r="http://schemas.openxmlformats.org/officeDocument/2006/relationships" xmlns:p="http://schemas.openxmlformats.org/presentationml/2006/main">
+  <p:cSld>
+    <p:spTree>
+      <p:nvGrpSpPr>
+        <p:cNvPr id="1" name=""/>
+        <p:cNvGrpSpPr/>
+        <p:nvPr/>
+      </p:nvGrpSpPr>
+      <p:grpSpPr>
+        <a:xfrm>
+          <a:off x="0" y="0"/>
+          <a:ext cx="0" cy="0"/>
+          <a:chOff x="0" y="0"/>
+          <a:chExt cx="0" cy="0"/>
+        </a:xfrm>
+      </p:grpSpPr>
+      <p:sp>
+        <p:nvSpPr>
+          <p:cNvPr id="2" name="Title 1"/>
+          <p:cNvSpPr>
+            <a:spLocks noGrp="1"/>
+          </p:cNvSpPr>
+          <p:nvPr>
+            <p:ph type="title"/>
+          </p:nvPr>
+        </p:nvSpPr>
+        <p:spPr/>
+        <p:txBody>
+          <a:bodyPr/>
+          <a:lstStyle/>
+          <a:p>
+            <a:r>
+              <a:rPr lang="en-US" dirty="0" smtClean="0"/>
+              <a:t>Hardware </a:t>
+            </a:r>
+            <a:r>
+              <a:rPr lang="en-US" dirty="0" smtClean="0"/>
+              <a:t>Selection </a:t>
+            </a:r>
+            <a:r>
+              <a:rPr lang="mr-IN" dirty="0" smtClean="0"/>
+              <a:t>–</a:t>
+            </a:r>
+            <a:r>
+              <a:rPr lang="en-US" dirty="0" smtClean="0"/>
+              <a:t> CPU</a:t>
+            </a:r>
+            <a:endParaRPr lang="en-US" dirty="0"/>
+          </a:p>
+        </p:txBody>
+      </p:sp>
+      <p:sp>
+        <p:nvSpPr>
+          <p:cNvPr id="3" name="Content Placeholder 2"/>
+          <p:cNvSpPr>
+            <a:spLocks noGrp="1"/>
+          </p:cNvSpPr>
+          <p:nvPr>
+            <p:ph idx="1"/>
+          </p:nvPr>
+        </p:nvSpPr>
+        <p:spPr/>
+        <p:txBody>
+          <a:bodyPr/>
+          <a:lstStyle/>
+          <a:p>
+            <a:pPr lvl="1"/>
+            <a:r>
+              <a:rPr lang="en-US" dirty="0" smtClean="0"/>
+              <a:t>Processing power is </a:t>
+            </a:r>
+            <a:r>
+              <a:rPr lang="en-US" b="1" u="sng" dirty="0" smtClean="0"/>
+              <a:t>not as important as disk and memory</a:t>
+            </a:r>
+            <a:r>
+              <a:rPr lang="en-US" dirty="0" smtClean="0"/>
+              <a:t>, but it will affect overall performance of broker to some extent.</a:t>
+            </a:r>
+          </a:p>
+          <a:p>
+            <a:pPr lvl="1"/>
+            <a:r>
+              <a:rPr lang="en-US" b="1" dirty="0" smtClean="0"/>
+              <a:t>Reason</a:t>
+            </a:r>
+            <a:r>
+              <a:rPr lang="en-US" dirty="0" smtClean="0"/>
+              <a:t>: Kafka broker must decompress all messages, validate checksum, assign offset, recompress in order to store on disk.</a:t>
+            </a:r>
+            <a:endParaRPr lang="en-US" b="1" dirty="0" smtClean="0"/>
+          </a:p>
+          <a:p>
+            <a:pPr lvl="1"/>
+            <a:r>
+              <a:rPr lang="en-US" b="1" dirty="0" smtClean="0"/>
+              <a:t>Improve</a:t>
+            </a:r>
+            <a:r>
+              <a:rPr lang="en-US" dirty="0" smtClean="0"/>
+              <a:t>: </a:t>
+            </a:r>
+          </a:p>
+          <a:p>
+            <a:pPr lvl="2"/>
+            <a:r>
+              <a:rPr lang="en-US" dirty="0" smtClean="0"/>
+              <a:t>Adding more CPU</a:t>
+            </a:r>
+            <a:endParaRPr lang="en-US" dirty="0"/>
+          </a:p>
+          <a:p>
+            <a:pPr lvl="2"/>
+            <a:r>
+              <a:rPr lang="en-US" dirty="0" smtClean="0"/>
+              <a:t>Replace with more powerful CPU</a:t>
+            </a:r>
+          </a:p>
+        </p:txBody>
+      </p:sp>
+    </p:spTree>
+    <p:extLst>
+      <p:ext uri="{BB962C8B-B14F-4D97-AF65-F5344CB8AC3E}">
+        <p14:creationId xmlns:p14="http://schemas.microsoft.com/office/powerpoint/2010/main" val="832949322"/>
+      </p:ext>
+    </p:extLst>
+  </p:cSld>
+  <p:clrMapOvr>
+    <a:masterClrMapping/>
+  </p:clrMapOvr>
+</p:sld>
+</file>
+
+<file path=ppt/slides/slide14.xml><?xml version="1.0" encoding="utf-8"?>
 <p:sld xmlns:a="http://schemas.openxmlformats.org/drawingml/2006/main" xmlns:r="http://schemas.openxmlformats.org/officeDocument/2006/relationships" xmlns:p="http://schemas.openxmlformats.org/presentationml/2006/main">
   <p:cSld>
     <p:spTree>
@@ -3614,7 +4076,7 @@
         </p:spPr>
         <p:txBody>
           <a:bodyPr>
-            <a:normAutofit/>
+            <a:normAutofit fontScale="92500" lnSpcReduction="10000"/>
           </a:bodyPr>
           <a:lstStyle/>
           <a:p>
@@ -3685,36 +4147,46 @@
           <a:p>
             <a:r>
               <a:rPr lang="en-US" dirty="0" smtClean="0"/>
-              <a:t>More</a:t>
+              <a:t>Hardware </a:t>
+            </a:r>
+            <a:r>
+              <a:rPr lang="en-US" dirty="0"/>
+              <a:t>Selection</a:t>
             </a:r>
           </a:p>
           <a:p>
             <a:pPr lvl="1"/>
             <a:r>
               <a:rPr lang="en-US" dirty="0"/>
-              <a:t>Hardware </a:t>
-            </a:r>
-            <a:r>
-              <a:rPr lang="en-US" dirty="0" smtClean="0"/>
-              <a:t>Selection</a:t>
+              <a:t>Disk Throughput</a:t>
             </a:r>
           </a:p>
           <a:p>
             <a:pPr lvl="1"/>
             <a:r>
               <a:rPr lang="en-US" dirty="0"/>
-              <a:t>OS </a:t>
-            </a:r>
-            <a:r>
-              <a:rPr lang="en-US" dirty="0" smtClean="0"/>
-              <a:t>Tuning</a:t>
+              <a:t>Disk Capacity</a:t>
             </a:r>
           </a:p>
           <a:p>
             <a:pPr lvl="1"/>
             <a:r>
               <a:rPr lang="en-US" dirty="0"/>
-              <a:t>Production Concerns</a:t>
+              <a:t>Memory</a:t>
+            </a:r>
+          </a:p>
+          <a:p>
+            <a:pPr lvl="1"/>
+            <a:r>
+              <a:rPr lang="en-US" dirty="0"/>
+              <a:t>Networking</a:t>
+            </a:r>
+          </a:p>
+          <a:p>
+            <a:pPr lvl="1"/>
+            <a:r>
+              <a:rPr lang="en-US" dirty="0" smtClean="0"/>
+              <a:t>CPU</a:t>
             </a:r>
             <a:endParaRPr lang="en-US" dirty="0" smtClean="0"/>
           </a:p>
@@ -3907,17 +4379,12 @@
           <a:p>
             <a:r>
               <a:rPr lang="en-US" dirty="0" smtClean="0"/>
-              <a:t>Instal</a:t>
-            </a:r>
-            <a:r>
-              <a:rPr lang="en-US" dirty="0" smtClean="0"/>
-              <a:t>l </a:t>
+              <a:t>Install </a:t>
             </a:r>
             <a:r>
               <a:rPr lang="en-US" dirty="0"/>
               <a:t>Java environment</a:t>
             </a:r>
-            <a:endParaRPr lang="en-US" dirty="0"/>
           </a:p>
         </p:txBody>
       </p:sp>
@@ -4268,11 +4735,7 @@
           <a:p>
             <a:r>
               <a:rPr lang="en-US" dirty="0" smtClean="0"/>
-              <a:t>Instal</a:t>
-            </a:r>
-            <a:r>
-              <a:rPr lang="en-US" dirty="0" smtClean="0"/>
-              <a:t>l Zookeeper*</a:t>
+              <a:t>Install Zookeeper*</a:t>
             </a:r>
             <a:endParaRPr lang="en-US" dirty="0"/>
           </a:p>
@@ -4856,11 +5319,7 @@
           <a:p>
             <a:r>
               <a:rPr lang="en-US" dirty="0" smtClean="0"/>
-              <a:t>Instal</a:t>
-            </a:r>
-            <a:r>
-              <a:rPr lang="en-US" dirty="0" smtClean="0"/>
-              <a:t>l a Kafka Broker</a:t>
+              <a:t>Install a Kafka Broker</a:t>
             </a:r>
             <a:endParaRPr lang="en-US" dirty="0"/>
           </a:p>
@@ -4886,11 +5345,7 @@
             </a:pPr>
             <a:r>
               <a:rPr lang="en-US" dirty="0" smtClean="0"/>
-              <a:t>Once Jav</a:t>
-            </a:r>
-            <a:r>
-              <a:rPr lang="en-US" dirty="0" smtClean="0"/>
-              <a:t>a and Zookeeper are configured, you are ready to install Apache Kafka. </a:t>
+              <a:t>Once Java and Zookeeper are configured, you are ready to install Apache Kafka. </a:t>
             </a:r>
             <a:endParaRPr lang="en-US" dirty="0"/>
           </a:p>
@@ -5584,7 +6039,57 @@
           <a:bodyPr/>
           <a:lstStyle/>
           <a:p>
+            <a:r>
+              <a:rPr lang="en-US" dirty="0" smtClean="0"/>
+              <a:t>Kafka itself has no strict requirement on a specific hardware configuration, and will run without issue on any system.</a:t>
+            </a:r>
+          </a:p>
+          <a:p>
+            <a:r>
+              <a:rPr lang="en-US" dirty="0" smtClean="0"/>
+              <a:t>Once performance becomes a concern, there are several factors that will contribute to the universal performance:</a:t>
+            </a:r>
             <a:endParaRPr lang="en-US" dirty="0"/>
+          </a:p>
+          <a:p>
+            <a:pPr lvl="1"/>
+            <a:r>
+              <a:rPr lang="en-US" dirty="0" smtClean="0"/>
+              <a:t>Disk Throughput</a:t>
+            </a:r>
+          </a:p>
+          <a:p>
+            <a:pPr lvl="1"/>
+            <a:r>
+              <a:rPr lang="en-US" dirty="0" smtClean="0"/>
+              <a:t>Disk Capacity</a:t>
+            </a:r>
+          </a:p>
+          <a:p>
+            <a:pPr lvl="1"/>
+            <a:r>
+              <a:rPr lang="en-US" dirty="0" smtClean="0"/>
+              <a:t>Memory</a:t>
+            </a:r>
+          </a:p>
+          <a:p>
+            <a:pPr lvl="1"/>
+            <a:r>
+              <a:rPr lang="en-US" dirty="0" smtClean="0"/>
+              <a:t>Networking</a:t>
+            </a:r>
+          </a:p>
+          <a:p>
+            <a:pPr lvl="1"/>
+            <a:r>
+              <a:rPr lang="en-US" dirty="0" smtClean="0"/>
+              <a:t>CPU</a:t>
+            </a:r>
+            <a:endParaRPr lang="en-US" dirty="0" smtClean="0"/>
+          </a:p>
+          <a:p>
+            <a:pPr lvl="1"/>
+            <a:endParaRPr lang="en-US" dirty="0" smtClean="0"/>
           </a:p>
         </p:txBody>
       </p:sp>
@@ -5635,7 +6140,11 @@
           <a:p>
             <a:r>
               <a:rPr lang="en-US" dirty="0" smtClean="0"/>
-              <a:t>OS Tuning</a:t>
+              <a:t>Hardware </a:t>
+            </a:r>
+            <a:r>
+              <a:rPr lang="en-US" dirty="0" smtClean="0"/>
+              <a:t>Selection -  Disk Throughput</a:t>
             </a:r>
             <a:endParaRPr lang="en-US" dirty="0"/>
           </a:p>
@@ -5656,14 +6165,63 @@
           <a:bodyPr/>
           <a:lstStyle/>
           <a:p>
-            <a:endParaRPr lang="en-US" dirty="0"/>
+            <a:pPr lvl="1"/>
+            <a:r>
+              <a:rPr lang="en-US" dirty="0" smtClean="0"/>
+              <a:t>The </a:t>
+            </a:r>
+            <a:r>
+              <a:rPr lang="en-US" b="1" u="sng" dirty="0" smtClean="0"/>
+              <a:t>performance of producer clients</a:t>
+            </a:r>
+            <a:r>
+              <a:rPr lang="en-US" dirty="0" smtClean="0"/>
+              <a:t> will be most directly influenced by the throughput of the broker disk that is used for storing log segments.</a:t>
+            </a:r>
+          </a:p>
+          <a:p>
+            <a:pPr lvl="1"/>
+            <a:r>
+              <a:rPr lang="en-US" b="1" dirty="0" smtClean="0"/>
+              <a:t>Reason</a:t>
+            </a:r>
+            <a:r>
+              <a:rPr lang="en-US" dirty="0" smtClean="0"/>
+              <a:t>: Kafka messages must be committed to local storage when they are produced.  Most clients will wait until at least one broker has confirmed that messages have been committed before considering the send  successful.</a:t>
+            </a:r>
+            <a:endParaRPr lang="en-US" b="1" dirty="0"/>
+          </a:p>
+          <a:p>
+            <a:pPr lvl="1"/>
+            <a:r>
+              <a:rPr lang="en-US" b="1" dirty="0" smtClean="0"/>
+              <a:t>Improve</a:t>
+            </a:r>
+            <a:r>
+              <a:rPr lang="en-US" dirty="0" smtClean="0"/>
+              <a:t>: </a:t>
+            </a:r>
+          </a:p>
+          <a:p>
+            <a:pPr lvl="2"/>
+            <a:r>
+              <a:rPr lang="en-US" dirty="0" smtClean="0"/>
+              <a:t>SSD</a:t>
+            </a:r>
+          </a:p>
+          <a:p>
+            <a:pPr lvl="2"/>
+            <a:r>
+              <a:rPr lang="en-US" dirty="0" smtClean="0"/>
+              <a:t>RAID</a:t>
+            </a:r>
           </a:p>
         </p:txBody>
       </p:sp>
     </p:spTree>
     <p:extLst>
       <p:ext uri="{BB962C8B-B14F-4D97-AF65-F5344CB8AC3E}">
-        <p14:creationId xmlns:p14="http://schemas.microsoft.com/office/powerpoint/2010/main" val="1387252495"/>
+        <p14:creationId xmlns:p14="http://schemas.microsoft.com/office/powerpoint/2010/main" val="173415590"/>
       </p:ext>
     </p:extLst>
   </p:cSld>

</xml_diff>